<commit_message>
[#110] Add priority implementation documentation (#124)
* Add major/minor feature documentation for everyone

* Userguide typo fixes

* Edit docmentation of Natania major/minor feature

* Fix undo/redo implementation documentation

* Add figure reference

* Fix static method

* Add diagrams and images

* Add implementation of priority documentation

* Test fix
</commit_message>
<xml_diff>
--- a/docs/diagrams/UndoRedoSequenceDiagram.pptx
+++ b/docs/diagrams/UndoRedoSequenceDiagram.pptx
@@ -109,7 +109,7 @@
   </p:defaultTextStyle>
   <p:extLst>
     <p:ext uri="{EFAFB233-063F-42B5-8137-9DF3F51BA10A}">
-      <p15:sldGuideLst xmlns:p15="http://schemas.microsoft.com/office/powerpoint/2012/main" xmlns="">
+      <p15:sldGuideLst xmlns="" xmlns:p15="http://schemas.microsoft.com/office/powerpoint/2012/main">
         <p15:guide id="1" orient="horz" pos="1488">
           <p15:clr>
             <a:srgbClr val="A4A3A4"/>
@@ -208,7 +208,7 @@
           <a:p>
             <a:fld id="{F5CC4B3F-88C1-4FFA-B1B6-F41C21DC6924}" type="datetimeFigureOut">
               <a:rPr lang="en-US" smtClean="0"/>
-              <a:t>3/5/2018</a:t>
+              <a:t>3/19/2018</a:t>
             </a:fld>
             <a:endParaRPr lang="en-US"/>
           </a:p>
@@ -654,7 +654,7 @@
           <a:p>
             <a:fld id="{78C97017-6FC3-485B-9764-EAC9E56C1D49}" type="datetimeFigureOut">
               <a:rPr lang="en-US" smtClean="0"/>
-              <a:t>3/5/2018</a:t>
+              <a:t>3/19/2018</a:t>
             </a:fld>
             <a:endParaRPr lang="en-US"/>
           </a:p>
@@ -822,7 +822,7 @@
           <a:p>
             <a:fld id="{78C97017-6FC3-485B-9764-EAC9E56C1D49}" type="datetimeFigureOut">
               <a:rPr lang="en-US" smtClean="0"/>
-              <a:t>3/5/2018</a:t>
+              <a:t>3/19/2018</a:t>
             </a:fld>
             <a:endParaRPr lang="en-US"/>
           </a:p>
@@ -1000,7 +1000,7 @@
           <a:p>
             <a:fld id="{78C97017-6FC3-485B-9764-EAC9E56C1D49}" type="datetimeFigureOut">
               <a:rPr lang="en-US" smtClean="0"/>
-              <a:t>3/5/2018</a:t>
+              <a:t>3/19/2018</a:t>
             </a:fld>
             <a:endParaRPr lang="en-US"/>
           </a:p>
@@ -1168,7 +1168,7 @@
           <a:p>
             <a:fld id="{78C97017-6FC3-485B-9764-EAC9E56C1D49}" type="datetimeFigureOut">
               <a:rPr lang="en-US" smtClean="0"/>
-              <a:t>3/5/2018</a:t>
+              <a:t>3/19/2018</a:t>
             </a:fld>
             <a:endParaRPr lang="en-US"/>
           </a:p>
@@ -1413,7 +1413,7 @@
           <a:p>
             <a:fld id="{78C97017-6FC3-485B-9764-EAC9E56C1D49}" type="datetimeFigureOut">
               <a:rPr lang="en-US" smtClean="0"/>
-              <a:t>3/5/2018</a:t>
+              <a:t>3/19/2018</a:t>
             </a:fld>
             <a:endParaRPr lang="en-US"/>
           </a:p>
@@ -1698,7 +1698,7 @@
           <a:p>
             <a:fld id="{78C97017-6FC3-485B-9764-EAC9E56C1D49}" type="datetimeFigureOut">
               <a:rPr lang="en-US" smtClean="0"/>
-              <a:t>3/5/2018</a:t>
+              <a:t>3/19/2018</a:t>
             </a:fld>
             <a:endParaRPr lang="en-US"/>
           </a:p>
@@ -2117,7 +2117,7 @@
           <a:p>
             <a:fld id="{78C97017-6FC3-485B-9764-EAC9E56C1D49}" type="datetimeFigureOut">
               <a:rPr lang="en-US" smtClean="0"/>
-              <a:t>3/5/2018</a:t>
+              <a:t>3/19/2018</a:t>
             </a:fld>
             <a:endParaRPr lang="en-US"/>
           </a:p>
@@ -2234,7 +2234,7 @@
           <a:p>
             <a:fld id="{78C97017-6FC3-485B-9764-EAC9E56C1D49}" type="datetimeFigureOut">
               <a:rPr lang="en-US" smtClean="0"/>
-              <a:t>3/5/2018</a:t>
+              <a:t>3/19/2018</a:t>
             </a:fld>
             <a:endParaRPr lang="en-US"/>
           </a:p>
@@ -2329,7 +2329,7 @@
           <a:p>
             <a:fld id="{78C97017-6FC3-485B-9764-EAC9E56C1D49}" type="datetimeFigureOut">
               <a:rPr lang="en-US" smtClean="0"/>
-              <a:t>3/5/2018</a:t>
+              <a:t>3/19/2018</a:t>
             </a:fld>
             <a:endParaRPr lang="en-US"/>
           </a:p>
@@ -2604,7 +2604,7 @@
           <a:p>
             <a:fld id="{78C97017-6FC3-485B-9764-EAC9E56C1D49}" type="datetimeFigureOut">
               <a:rPr lang="en-US" smtClean="0"/>
-              <a:t>3/5/2018</a:t>
+              <a:t>3/19/2018</a:t>
             </a:fld>
             <a:endParaRPr lang="en-US"/>
           </a:p>
@@ -2856,7 +2856,7 @@
           <a:p>
             <a:fld id="{78C97017-6FC3-485B-9764-EAC9E56C1D49}" type="datetimeFigureOut">
               <a:rPr lang="en-US" smtClean="0"/>
-              <a:t>3/5/2018</a:t>
+              <a:t>3/19/2018</a:t>
             </a:fld>
             <a:endParaRPr lang="en-US"/>
           </a:p>
@@ -3067,7 +3067,7 @@
           <a:p>
             <a:fld id="{78C97017-6FC3-485B-9764-EAC9E56C1D49}" type="datetimeFigureOut">
               <a:rPr lang="en-US" smtClean="0"/>
-              <a:t>3/5/2018</a:t>
+              <a:t>3/19/2018</a:t>
             </a:fld>
             <a:endParaRPr lang="en-US"/>
           </a:p>
@@ -3664,8 +3664,8 @@
         </p:nvSpPr>
         <p:spPr>
           <a:xfrm>
-            <a:off x="3437188" y="423022"/>
-            <a:ext cx="1219200" cy="467684"/>
+            <a:off x="3243421" y="423022"/>
+            <a:ext cx="1612173" cy="467684"/>
           </a:xfrm>
           <a:prstGeom prst="rect">
             <a:avLst/>
@@ -3705,23 +3705,15 @@
                   <a:schemeClr val="bg1"/>
                 </a:solidFill>
               </a:rPr>
-              <a:t>:Task</a:t>
-            </a:r>
-            <a:endParaRPr lang="en-US" sz="1600" dirty="0">
-              <a:solidFill>
-                <a:schemeClr val="bg1"/>
-              </a:solidFill>
-            </a:endParaRPr>
-          </a:p>
-          <a:p>
-            <a:pPr algn="ctr"/>
-            <a:r>
-              <a:rPr lang="en-US" sz="1600" dirty="0" err="1">
+              <a:t>:</a:t>
+            </a:r>
+            <a:r>
+              <a:rPr lang="en-US" sz="1600" dirty="0" err="1" smtClean="0">
                 <a:solidFill>
                   <a:schemeClr val="bg1"/>
                 </a:solidFill>
               </a:rPr>
-              <a:t>BookParser</a:t>
+              <a:t>OrganizerParser</a:t>
             </a:r>
             <a:endParaRPr lang="en-SG" sz="1600" dirty="0">
               <a:solidFill>
@@ -4913,7 +4905,7 @@
           <p:cNvPr id="66" name="Straight Arrow Connector 65">
             <a:extLst>
               <a:ext uri="{FF2B5EF4-FFF2-40B4-BE49-F238E27FC236}">
-                <a16:creationId xmlns:a16="http://schemas.microsoft.com/office/drawing/2014/main" xmlns="" id="{39916E2E-195A-4DC8-B025-B05FA87E6796}"/>
+                <a16:creationId xmlns="" xmlns:a16="http://schemas.microsoft.com/office/drawing/2014/main" id="{39916E2E-195A-4DC8-B025-B05FA87E6796}"/>
               </a:ext>
             </a:extLst>
           </p:cNvPr>
@@ -4957,7 +4949,7 @@
           <p:cNvPr id="67" name="Straight Arrow Connector 66">
             <a:extLst>
               <a:ext uri="{FF2B5EF4-FFF2-40B4-BE49-F238E27FC236}">
-                <a16:creationId xmlns:a16="http://schemas.microsoft.com/office/drawing/2014/main" xmlns="" id="{D881596E-177C-4FDC-8E60-CAB90B3D5FAB}"/>
+                <a16:creationId xmlns="" xmlns:a16="http://schemas.microsoft.com/office/drawing/2014/main" id="{D881596E-177C-4FDC-8E60-CAB90B3D5FAB}"/>
               </a:ext>
             </a:extLst>
           </p:cNvPr>
@@ -5001,7 +4993,7 @@
           <p:cNvPr id="69" name="Straight Arrow Connector 68">
             <a:extLst>
               <a:ext uri="{FF2B5EF4-FFF2-40B4-BE49-F238E27FC236}">
-                <a16:creationId xmlns:a16="http://schemas.microsoft.com/office/drawing/2014/main" xmlns="" id="{7C9F21BC-13A9-471F-825A-2621FD36355F}"/>
+                <a16:creationId xmlns="" xmlns:a16="http://schemas.microsoft.com/office/drawing/2014/main" id="{7C9F21BC-13A9-471F-825A-2621FD36355F}"/>
               </a:ext>
             </a:extLst>
           </p:cNvPr>
@@ -5047,7 +5039,7 @@
           <p:cNvPr id="74" name="Straight Arrow Connector 73">
             <a:extLst>
               <a:ext uri="{FF2B5EF4-FFF2-40B4-BE49-F238E27FC236}">
-                <a16:creationId xmlns:a16="http://schemas.microsoft.com/office/drawing/2014/main" xmlns="" id="{854D9FBB-2B36-4DC9-8B58-F7F177A8E586}"/>
+                <a16:creationId xmlns="" xmlns:a16="http://schemas.microsoft.com/office/drawing/2014/main" id="{854D9FBB-2B36-4DC9-8B58-F7F177A8E586}"/>
               </a:ext>
             </a:extLst>
           </p:cNvPr>
@@ -5093,7 +5085,7 @@
           <p:cNvPr id="85" name="TextBox 84">
             <a:extLst>
               <a:ext uri="{FF2B5EF4-FFF2-40B4-BE49-F238E27FC236}">
-                <a16:creationId xmlns:a16="http://schemas.microsoft.com/office/drawing/2014/main" xmlns="" id="{ABFA3722-C3DD-4BF5-815F-9CFBE6942C90}"/>
+                <a16:creationId xmlns="" xmlns:a16="http://schemas.microsoft.com/office/drawing/2014/main" id="{ABFA3722-C3DD-4BF5-815F-9CFBE6942C90}"/>
               </a:ext>
             </a:extLst>
           </p:cNvPr>
@@ -5140,7 +5132,7 @@
           <p:cNvPr id="88" name="TextBox 87">
             <a:extLst>
               <a:ext uri="{FF2B5EF4-FFF2-40B4-BE49-F238E27FC236}">
-                <a16:creationId xmlns:a16="http://schemas.microsoft.com/office/drawing/2014/main" xmlns="" id="{B85C6184-7378-4E89-A338-72B1E5056F4F}"/>
+                <a16:creationId xmlns="" xmlns:a16="http://schemas.microsoft.com/office/drawing/2014/main" id="{B85C6184-7378-4E89-A338-72B1E5056F4F}"/>
               </a:ext>
             </a:extLst>
           </p:cNvPr>
@@ -5186,7 +5178,7 @@
           <p:cNvPr id="89" name="Straight Connector 88">
             <a:extLst>
               <a:ext uri="{FF2B5EF4-FFF2-40B4-BE49-F238E27FC236}">
-                <a16:creationId xmlns:a16="http://schemas.microsoft.com/office/drawing/2014/main" xmlns="" id="{E4E1C8CA-49DF-45D8-80A5-D5C8282EE927}"/>
+                <a16:creationId xmlns="" xmlns:a16="http://schemas.microsoft.com/office/drawing/2014/main" id="{E4E1C8CA-49DF-45D8-80A5-D5C8282EE927}"/>
               </a:ext>
             </a:extLst>
           </p:cNvPr>

</xml_diff>